<commit_message>
minor edit lecture 10
</commit_message>
<xml_diff>
--- a/BDL2024 - 10 - Blockchain Applications.pptx
+++ b/BDL2024 - 10 - Blockchain Applications.pptx
@@ -40748,7 +40748,7 @@
         <p:spPr>
           <a:xfrm>
             <a:off x="1067745" y="3090257"/>
-            <a:ext cx="4144083" cy="523220"/>
+            <a:ext cx="4262705" cy="1600438"/>
           </a:xfrm>
           <a:prstGeom prst="rect">
             <a:avLst/>
@@ -40767,7 +40767,7 @@
             </a:pPr>
             <a:r>
               <a:rPr lang="en-US" dirty="0"/>
-              <a:t>Buy X for b’ Y </a:t>
+              <a:t>Buy A tokens with b’ amount of B tokens</a:t>
             </a:r>
           </a:p>
           <a:p>
@@ -40791,9 +40791,61 @@
               <a:rPr lang="en-US" dirty="0">
                 <a:sym typeface="Wingdings" pitchFamily="2" charset="2"/>
               </a:rPr>
-              <a:t> a’ = ab’/(b  + b’) </a:t>
-            </a:r>
-            <a:endParaRPr lang="en-US" dirty="0"/>
+              <a:t> a’ = ab’/(b  + b’)</a:t>
+            </a:r>
+          </a:p>
+          <a:p>
+            <a:pPr marL="285750" indent="-285750">
+              <a:buFont typeface="Symbol" pitchFamily="2" charset="2"/>
+              <a:buChar char="Þ"/>
+            </a:pPr>
+            <a:endParaRPr lang="en-US" dirty="0">
+              <a:sym typeface="Wingdings" pitchFamily="2" charset="2"/>
+            </a:endParaRPr>
+          </a:p>
+          <a:p>
+            <a:r>
+              <a:rPr lang="en-US" dirty="0">
+                <a:sym typeface="Wingdings" pitchFamily="2" charset="2"/>
+              </a:rPr>
+              <a:t>If a’&lt;&lt;a and b’&lt;&lt;b then  a’ ~= b’ (a/b) </a:t>
+            </a:r>
+          </a:p>
+          <a:p>
+            <a:r>
+              <a:rPr lang="en-US" dirty="0">
+                <a:sym typeface="Wingdings" pitchFamily="2" charset="2"/>
+              </a:rPr>
+              <a:t>	(but can be far from a/b otherwise)</a:t>
+            </a:r>
+          </a:p>
+          <a:p>
+            <a:endParaRPr lang="en-US" dirty="0">
+              <a:sym typeface="Wingdings" pitchFamily="2" charset="2"/>
+            </a:endParaRPr>
+          </a:p>
+          <a:p>
+            <a:r>
+              <a:rPr lang="en-US" dirty="0">
+                <a:sym typeface="Wingdings" pitchFamily="2" charset="2"/>
+              </a:rPr>
+              <a:t>“Liquidity providers” are incentivized to keep </a:t>
+            </a:r>
+            <a:r>
+              <a:rPr lang="en-US" dirty="0" err="1">
+                <a:sym typeface="Wingdings" pitchFamily="2" charset="2"/>
+              </a:rPr>
+              <a:t>a,b</a:t>
+            </a:r>
+            <a:r>
+              <a:rPr lang="en-US">
+                <a:sym typeface="Wingdings" pitchFamily="2" charset="2"/>
+              </a:rPr>
+              <a:t> big</a:t>
+            </a:r>
+            <a:endParaRPr lang="en-US" dirty="0">
+              <a:sym typeface="Wingdings" pitchFamily="2" charset="2"/>
+            </a:endParaRPr>
           </a:p>
         </p:txBody>
       </p:sp>

</xml_diff>